<commit_message>
Refine notes on hash tables to specifically multi-way hash tables
</commit_message>
<xml_diff>
--- a/docs/p4runtime api batch operations.pptx
+++ b/docs/p4runtime api batch operations.pptx
@@ -112,6 +112,11 @@
       </a:defRPr>
     </a:lvl9pPr>
   </p:defaultTextStyle>
+  <p:extLst>
+    <p:ext uri="{EFAFB233-063F-42B5-8137-9DF3F51BA10A}">
+      <p15:sldGuideLst xmlns:p15="http://schemas.microsoft.com/office/powerpoint/2012/main"/>
+    </p:ext>
+  </p:extLst>
 </p:presentation>
 </file>
 
@@ -3910,7 +3915,7 @@
           <a:p>
             <a:r>
               <a:rPr lang="en-US" dirty="0"/>
-              <a:t>Some properties of hash tables</a:t>
+              <a:t>Some properties of multi-way hash tables</a:t>
             </a:r>
           </a:p>
         </p:txBody>
@@ -3934,7 +3939,7 @@
         <p:spPr/>
         <p:txBody>
           <a:bodyPr>
-            <a:normAutofit fontScale="92500" lnSpcReduction="10000"/>
+            <a:normAutofit fontScale="85000" lnSpcReduction="20000"/>
           </a:bodyPr>
           <a:lstStyle/>
           <a:p>
@@ -3963,6 +3968,21 @@
             <a:r>
               <a:rPr lang="en-US" dirty="0"/>
               <a:t>’ time, and examine at most a small finite number of hash ‘buckets’ per search.</a:t>
+            </a:r>
+          </a:p>
+          <a:p>
+            <a:pPr lvl="1"/>
+            <a:r>
+              <a:rPr lang="en-US" dirty="0"/>
+              <a:t>By ‘multi-way’ I mean something like D left or 2-way hashing, generalized to N ways.  These calculate 2 or more hash functions on the same key, looking up each hash function as an index into a separate sub-table of hash buckets.  Significantly higher utilizations can be achieved with these, </a:t>
+            </a:r>
+            <a:r>
+              <a:rPr lang="en-US"/>
+              <a:t>versus using only 1 </a:t>
+            </a:r>
+            <a:r>
+              <a:rPr lang="en-US" dirty="0"/>
+              <a:t>way.</a:t>
             </a:r>
           </a:p>
           <a:p>

</xml_diff>

<commit_message>
Add small note about 'not really all-or-none' batch implementation
</commit_message>
<xml_diff>
--- a/docs/p4runtime api batch operations.pptx
+++ b/docs/p4runtime api batch operations.pptx
@@ -4154,7 +4154,23 @@
           <a:p>
             <a:r>
               <a:rPr lang="en-US" dirty="0"/>
-              <a:t>But, what are its semantics, and are those semantics useful?</a:t>
+              <a:t>But its behavior is not really “all-or-none”.  It is all, or none, or any prefix.  This is the </a:t>
+            </a:r>
+            <a:r>
+              <a:rPr lang="en-US" u="sng" dirty="0"/>
+              <a:t>same</a:t>
+            </a:r>
+            <a:r>
+              <a:rPr lang="en-US" dirty="0"/>
+              <a:t> set of final resulting states as you can be in when you </a:t>
+            </a:r>
+            <a:r>
+              <a:rPr lang="en-US"/>
+              <a:t>use the </a:t>
+            </a:r>
+            <a:r>
+              <a:rPr lang="en-US" dirty="0"/>
+              <a:t>“stop on first error” mode</a:t>
             </a:r>
           </a:p>
           <a:p>

</xml_diff>

<commit_message>
Add example of atomic batch operation for ACLs
</commit_message>
<xml_diff>
--- a/docs/p4runtime api batch operations.pptx
+++ b/docs/p4runtime api batch operations.pptx
@@ -14,6 +14,11 @@
     <p:sldId id="262" r:id="rId8"/>
     <p:sldId id="264" r:id="rId9"/>
     <p:sldId id="260" r:id="rId10"/>
+    <p:sldId id="265" r:id="rId11"/>
+    <p:sldId id="266" r:id="rId12"/>
+    <p:sldId id="268" r:id="rId13"/>
+    <p:sldId id="267" r:id="rId14"/>
+    <p:sldId id="269" r:id="rId15"/>
   </p:sldIdLst>
   <p:sldSz cx="12192000" cy="6858000"/>
   <p:notesSz cx="6858000" cy="9144000"/>
@@ -3419,6 +3424,951 @@
 </p:sld>
 </file>
 
+<file path=ppt/slides/slide10.xml><?xml version="1.0" encoding="utf-8"?>
+<p:sld xmlns:a="http://schemas.openxmlformats.org/drawingml/2006/main" xmlns:r="http://schemas.openxmlformats.org/officeDocument/2006/relationships" xmlns:p="http://schemas.openxmlformats.org/presentationml/2006/main">
+  <p:cSld>
+    <p:spTree>
+      <p:nvGrpSpPr>
+        <p:cNvPr id="1" name=""/>
+        <p:cNvGrpSpPr/>
+        <p:nvPr/>
+      </p:nvGrpSpPr>
+      <p:grpSpPr>
+        <a:xfrm>
+          <a:off x="0" y="0"/>
+          <a:ext cx="0" cy="0"/>
+          <a:chOff x="0" y="0"/>
+          <a:chExt cx="0" cy="0"/>
+        </a:xfrm>
+      </p:grpSpPr>
+      <p:sp>
+        <p:nvSpPr>
+          <p:cNvPr id="2" name="Title 1">
+            <a:extLst>
+              <a:ext uri="{FF2B5EF4-FFF2-40B4-BE49-F238E27FC236}">
+                <a16:creationId xmlns:a16="http://schemas.microsoft.com/office/drawing/2014/main" id="{52D7EE3F-7B5C-A748-BB2C-9D409CAA3E98}"/>
+              </a:ext>
+            </a:extLst>
+          </p:cNvPr>
+          <p:cNvSpPr>
+            <a:spLocks noGrp="1"/>
+          </p:cNvSpPr>
+          <p:nvPr>
+            <p:ph type="title"/>
+          </p:nvPr>
+        </p:nvSpPr>
+        <p:spPr/>
+        <p:txBody>
+          <a:bodyPr/>
+          <a:lstStyle/>
+          <a:p>
+            <a:r>
+              <a:rPr lang="en-US" dirty="0"/>
+              <a:t>General pattern</a:t>
+            </a:r>
+          </a:p>
+        </p:txBody>
+      </p:sp>
+      <p:sp>
+        <p:nvSpPr>
+          <p:cNvPr id="3" name="Content Placeholder 2">
+            <a:extLst>
+              <a:ext uri="{FF2B5EF4-FFF2-40B4-BE49-F238E27FC236}">
+                <a16:creationId xmlns:a16="http://schemas.microsoft.com/office/drawing/2014/main" id="{16C2033F-06C2-4145-8B5C-7BAF725CBE1D}"/>
+              </a:ext>
+            </a:extLst>
+          </p:cNvPr>
+          <p:cNvSpPr>
+            <a:spLocks noGrp="1"/>
+          </p:cNvSpPr>
+          <p:nvPr>
+            <p:ph idx="1"/>
+          </p:nvPr>
+        </p:nvSpPr>
+        <p:spPr/>
+        <p:txBody>
+          <a:bodyPr/>
+          <a:lstStyle/>
+          <a:p>
+            <a:r>
+              <a:rPr lang="en-US" dirty="0"/>
+              <a:t>The atomic batch on previous slide is a general ‘atomic pointer flipping’ technique that can be applied to smaller subsets of tables.</a:t>
+            </a:r>
+          </a:p>
+          <a:p>
+            <a:pPr lvl="1"/>
+            <a:r>
+              <a:rPr lang="en-US" dirty="0"/>
+              <a:t>The ‘pointer’ being flipped in previous slide is the blue/red bit, ‘pointing’ at one of two sets of tables.</a:t>
+            </a:r>
+          </a:p>
+          <a:p>
+            <a:r>
+              <a:rPr lang="en-US" dirty="0"/>
+              <a:t>Fleshed out example on next slide.</a:t>
+            </a:r>
+          </a:p>
+        </p:txBody>
+      </p:sp>
+    </p:spTree>
+    <p:extLst>
+      <p:ext uri="{BB962C8B-B14F-4D97-AF65-F5344CB8AC3E}">
+        <p14:creationId xmlns:p14="http://schemas.microsoft.com/office/powerpoint/2010/main" val="1159024090"/>
+      </p:ext>
+    </p:extLst>
+  </p:cSld>
+  <p:clrMapOvr>
+    <a:masterClrMapping/>
+  </p:clrMapOvr>
+</p:sld>
+</file>
+
+<file path=ppt/slides/slide11.xml><?xml version="1.0" encoding="utf-8"?>
+<p:sld xmlns:a="http://schemas.openxmlformats.org/drawingml/2006/main" xmlns:r="http://schemas.openxmlformats.org/officeDocument/2006/relationships" xmlns:p="http://schemas.openxmlformats.org/presentationml/2006/main">
+  <p:cSld>
+    <p:spTree>
+      <p:nvGrpSpPr>
+        <p:cNvPr id="1" name=""/>
+        <p:cNvGrpSpPr/>
+        <p:nvPr/>
+      </p:nvGrpSpPr>
+      <p:grpSpPr>
+        <a:xfrm>
+          <a:off x="0" y="0"/>
+          <a:ext cx="0" cy="0"/>
+          <a:chOff x="0" y="0"/>
+          <a:chExt cx="0" cy="0"/>
+        </a:xfrm>
+      </p:grpSpPr>
+      <p:sp>
+        <p:nvSpPr>
+          <p:cNvPr id="2" name="Title 1">
+            <a:extLst>
+              <a:ext uri="{FF2B5EF4-FFF2-40B4-BE49-F238E27FC236}">
+                <a16:creationId xmlns:a16="http://schemas.microsoft.com/office/drawing/2014/main" id="{51DBD7A3-5103-EA44-BB76-A195A37C4FCA}"/>
+              </a:ext>
+            </a:extLst>
+          </p:cNvPr>
+          <p:cNvSpPr>
+            <a:spLocks noGrp="1"/>
+          </p:cNvSpPr>
+          <p:nvPr>
+            <p:ph type="title"/>
+          </p:nvPr>
+        </p:nvSpPr>
+        <p:spPr/>
+        <p:txBody>
+          <a:bodyPr/>
+          <a:lstStyle/>
+          <a:p>
+            <a:r>
+              <a:rPr lang="en-US" dirty="0"/>
+              <a:t>Atomic switch from old ACL to new ACL</a:t>
+            </a:r>
+          </a:p>
+        </p:txBody>
+      </p:sp>
+      <p:sp>
+        <p:nvSpPr>
+          <p:cNvPr id="3" name="Content Placeholder 2">
+            <a:extLst>
+              <a:ext uri="{FF2B5EF4-FFF2-40B4-BE49-F238E27FC236}">
+                <a16:creationId xmlns:a16="http://schemas.microsoft.com/office/drawing/2014/main" id="{58F06C8D-2F46-4F4E-92F6-7333A3848AC4}"/>
+              </a:ext>
+            </a:extLst>
+          </p:cNvPr>
+          <p:cNvSpPr>
+            <a:spLocks noGrp="1"/>
+          </p:cNvSpPr>
+          <p:nvPr>
+            <p:ph idx="1"/>
+          </p:nvPr>
+        </p:nvSpPr>
+        <p:spPr/>
+        <p:txBody>
+          <a:bodyPr>
+            <a:normAutofit fontScale="92500" lnSpcReduction="20000"/>
+          </a:bodyPr>
+          <a:lstStyle/>
+          <a:p>
+            <a:r>
+              <a:rPr lang="en-US" dirty="0"/>
+              <a:t>Scenario:</a:t>
+            </a:r>
+          </a:p>
+          <a:p>
+            <a:pPr lvl="1"/>
+            <a:r>
+              <a:rPr lang="en-US" dirty="0"/>
+              <a:t>User can configure an ACL (Access Control List) that matches on IP source &amp; </a:t>
+            </a:r>
+            <a:r>
+              <a:rPr lang="en-US" dirty="0" err="1"/>
+              <a:t>dest</a:t>
+            </a:r>
+            <a:r>
+              <a:rPr lang="en-US" dirty="0"/>
+              <a:t> address, IP protocol, and TCP/UDP source &amp; </a:t>
+            </a:r>
+            <a:r>
+              <a:rPr lang="en-US" dirty="0" err="1"/>
+              <a:t>dest</a:t>
+            </a:r>
+            <a:r>
+              <a:rPr lang="en-US" dirty="0"/>
+              <a:t> port using ternary matching, with each table entry giving either allow or drop action for packet.</a:t>
+            </a:r>
+          </a:p>
+          <a:p>
+            <a:pPr lvl="2"/>
+            <a:r>
+              <a:rPr lang="en-US" dirty="0"/>
+              <a:t>A single ACL is a named, ordered </a:t>
+            </a:r>
+            <a:r>
+              <a:rPr lang="en-US" u="sng" dirty="0"/>
+              <a:t>list</a:t>
+            </a:r>
+            <a:r>
+              <a:rPr lang="en-US" dirty="0"/>
+              <a:t> of ternary matching rules, each with its own independent allow/drop action.</a:t>
+            </a:r>
+          </a:p>
+          <a:p>
+            <a:pPr lvl="1"/>
+            <a:r>
+              <a:rPr lang="en-US" dirty="0"/>
+              <a:t>Configuration can specify for each input port an ACL name that should be applied to all packets arriving from that input port.</a:t>
+            </a:r>
+          </a:p>
+          <a:p>
+            <a:pPr lvl="1"/>
+            <a:r>
+              <a:rPr lang="en-US" dirty="0"/>
+              <a:t>Currently the configuration has all packets arriving on port P filtered according to the ACL named ‘</a:t>
+            </a:r>
+            <a:r>
+              <a:rPr lang="en-US" dirty="0" err="1"/>
+              <a:t>old_acl</a:t>
+            </a:r>
+            <a:r>
+              <a:rPr lang="en-US" dirty="0"/>
+              <a:t>’.</a:t>
+            </a:r>
+          </a:p>
+          <a:p>
+            <a:pPr lvl="1"/>
+            <a:r>
+              <a:rPr lang="en-US" dirty="0"/>
+              <a:t>Network operator decides they want to change that to ‘</a:t>
+            </a:r>
+            <a:r>
+              <a:rPr lang="en-US" dirty="0" err="1"/>
+              <a:t>new_acl</a:t>
+            </a:r>
+            <a:r>
+              <a:rPr lang="en-US" dirty="0"/>
+              <a:t>’.</a:t>
+            </a:r>
+          </a:p>
+          <a:p>
+            <a:pPr lvl="1"/>
+            <a:r>
+              <a:rPr lang="en-US" dirty="0"/>
+              <a:t>Desired behavior in data plane:</a:t>
+            </a:r>
+          </a:p>
+          <a:p>
+            <a:pPr lvl="2"/>
+            <a:r>
+              <a:rPr lang="en-US" dirty="0"/>
+              <a:t>Every packet is processed according to ‘</a:t>
+            </a:r>
+            <a:r>
+              <a:rPr lang="en-US" dirty="0" err="1"/>
+              <a:t>old_acl</a:t>
+            </a:r>
+            <a:r>
+              <a:rPr lang="en-US" dirty="0"/>
+              <a:t>’, or ‘</a:t>
+            </a:r>
+            <a:r>
+              <a:rPr lang="en-US" dirty="0" err="1"/>
+              <a:t>new_acl</a:t>
+            </a:r>
+            <a:r>
+              <a:rPr lang="en-US" dirty="0"/>
+              <a:t>’, never something else, i.e. never a portion of ‘</a:t>
+            </a:r>
+            <a:r>
+              <a:rPr lang="en-US" dirty="0" err="1"/>
+              <a:t>old_acl</a:t>
+            </a:r>
+            <a:r>
+              <a:rPr lang="en-US" dirty="0"/>
+              <a:t>’, or a portion of ‘</a:t>
+            </a:r>
+            <a:r>
+              <a:rPr lang="en-US" dirty="0" err="1"/>
+              <a:t>new_acl</a:t>
+            </a:r>
+            <a:r>
+              <a:rPr lang="en-US" dirty="0"/>
+              <a:t>’.</a:t>
+            </a:r>
+          </a:p>
+          <a:p>
+            <a:pPr lvl="2"/>
+            <a:r>
+              <a:rPr lang="en-US" dirty="0"/>
+              <a:t>If ’</a:t>
+            </a:r>
+            <a:r>
+              <a:rPr lang="en-US" dirty="0" err="1"/>
+              <a:t>new_acl</a:t>
+            </a:r>
+            <a:r>
+              <a:rPr lang="en-US" dirty="0"/>
+              <a:t>’ doesn’t fit, fail the attempted </a:t>
+            </a:r>
+            <a:r>
+              <a:rPr lang="en-US" dirty="0" err="1"/>
+              <a:t>config</a:t>
+            </a:r>
+            <a:r>
+              <a:rPr lang="en-US" dirty="0"/>
+              <a:t> change and keep ‘</a:t>
+            </a:r>
+            <a:r>
+              <a:rPr lang="en-US" dirty="0" err="1"/>
+              <a:t>old_acl</a:t>
+            </a:r>
+            <a:r>
+              <a:rPr lang="en-US" dirty="0"/>
+              <a:t>’ at all times.</a:t>
+            </a:r>
+          </a:p>
+        </p:txBody>
+      </p:sp>
+    </p:spTree>
+    <p:extLst>
+      <p:ext uri="{BB962C8B-B14F-4D97-AF65-F5344CB8AC3E}">
+        <p14:creationId xmlns:p14="http://schemas.microsoft.com/office/powerpoint/2010/main" val="3915842886"/>
+      </p:ext>
+    </p:extLst>
+  </p:cSld>
+  <p:clrMapOvr>
+    <a:masterClrMapping/>
+  </p:clrMapOvr>
+</p:sld>
+</file>
+
+<file path=ppt/slides/slide12.xml><?xml version="1.0" encoding="utf-8"?>
+<p:sld xmlns:a="http://schemas.openxmlformats.org/drawingml/2006/main" xmlns:r="http://schemas.openxmlformats.org/officeDocument/2006/relationships" xmlns:p="http://schemas.openxmlformats.org/presentationml/2006/main">
+  <p:cSld>
+    <p:spTree>
+      <p:nvGrpSpPr>
+        <p:cNvPr id="1" name=""/>
+        <p:cNvGrpSpPr/>
+        <p:nvPr/>
+      </p:nvGrpSpPr>
+      <p:grpSpPr>
+        <a:xfrm>
+          <a:off x="0" y="0"/>
+          <a:ext cx="0" cy="0"/>
+          <a:chOff x="0" y="0"/>
+          <a:chExt cx="0" cy="0"/>
+        </a:xfrm>
+      </p:grpSpPr>
+      <p:sp>
+        <p:nvSpPr>
+          <p:cNvPr id="2" name="Title 1">
+            <a:extLst>
+              <a:ext uri="{FF2B5EF4-FFF2-40B4-BE49-F238E27FC236}">
+                <a16:creationId xmlns:a16="http://schemas.microsoft.com/office/drawing/2014/main" id="{28C57A9B-F0B1-8648-B1DE-8B7923B2CC3A}"/>
+              </a:ext>
+            </a:extLst>
+          </p:cNvPr>
+          <p:cNvSpPr>
+            <a:spLocks noGrp="1"/>
+          </p:cNvSpPr>
+          <p:nvPr>
+            <p:ph type="title"/>
+          </p:nvPr>
+        </p:nvSpPr>
+        <p:spPr/>
+        <p:txBody>
+          <a:bodyPr/>
+          <a:lstStyle/>
+          <a:p>
+            <a:r>
+              <a:rPr lang="en-US" dirty="0"/>
+              <a:t>Pointer-flipping for ACL scenario</a:t>
+            </a:r>
+          </a:p>
+        </p:txBody>
+      </p:sp>
+      <p:sp>
+        <p:nvSpPr>
+          <p:cNvPr id="3" name="Content Placeholder 2">
+            <a:extLst>
+              <a:ext uri="{FF2B5EF4-FFF2-40B4-BE49-F238E27FC236}">
+                <a16:creationId xmlns:a16="http://schemas.microsoft.com/office/drawing/2014/main" id="{43D69AC8-C779-5D46-A687-143EF8F24AE1}"/>
+              </a:ext>
+            </a:extLst>
+          </p:cNvPr>
+          <p:cNvSpPr>
+            <a:spLocks noGrp="1"/>
+          </p:cNvSpPr>
+          <p:nvPr>
+            <p:ph idx="1"/>
+          </p:nvPr>
+        </p:nvSpPr>
+        <p:spPr/>
+        <p:txBody>
+          <a:bodyPr/>
+          <a:lstStyle/>
+          <a:p>
+            <a:r>
+              <a:rPr lang="en-US" dirty="0"/>
+              <a:t>P4 code:</a:t>
+            </a:r>
+          </a:p>
+          <a:p>
+            <a:pPr lvl="1"/>
+            <a:r>
+              <a:rPr lang="en-US" dirty="0"/>
+              <a:t>Have a table ‘</a:t>
+            </a:r>
+            <a:r>
+              <a:rPr lang="en-US" dirty="0" err="1"/>
+              <a:t>port_to_acl_id</a:t>
+            </a:r>
+            <a:r>
+              <a:rPr lang="en-US" dirty="0"/>
+              <a:t>’ that has </a:t>
+            </a:r>
+            <a:r>
+              <a:rPr lang="en-US" dirty="0" err="1"/>
+              <a:t>ingress_port</a:t>
+            </a:r>
+            <a:r>
+              <a:rPr lang="en-US" dirty="0"/>
+              <a:t> as key, resulting in a control-plane chosen metadata field ‘</a:t>
+            </a:r>
+            <a:r>
+              <a:rPr lang="en-US" dirty="0" err="1"/>
+              <a:t>acl_id</a:t>
+            </a:r>
+            <a:r>
+              <a:rPr lang="en-US" dirty="0"/>
+              <a:t>’.</a:t>
+            </a:r>
+          </a:p>
+          <a:p>
+            <a:pPr lvl="2"/>
+            <a:r>
+              <a:rPr lang="en-US" dirty="0" err="1"/>
+              <a:t>Acl_id’s</a:t>
+            </a:r>
+            <a:r>
+              <a:rPr lang="en-US" dirty="0"/>
+              <a:t> are just a number dynamically allocated by the control plane, with a different </a:t>
+            </a:r>
+            <a:r>
+              <a:rPr lang="en-US" dirty="0" err="1"/>
+              <a:t>acl_id</a:t>
+            </a:r>
+            <a:r>
+              <a:rPr lang="en-US" dirty="0"/>
+              <a:t> for each ACL name.</a:t>
+            </a:r>
+          </a:p>
+          <a:p>
+            <a:pPr lvl="1"/>
+            <a:r>
+              <a:rPr lang="en-US" dirty="0"/>
+              <a:t>The ternary ACL lookup table ‘</a:t>
+            </a:r>
+            <a:r>
+              <a:rPr lang="en-US" dirty="0" err="1"/>
+              <a:t>acl_lookup</a:t>
+            </a:r>
+            <a:r>
+              <a:rPr lang="en-US" dirty="0"/>
+              <a:t>’ has key fields for IP SA, DA, protocol, L4 source &amp; </a:t>
+            </a:r>
+            <a:r>
+              <a:rPr lang="en-US" dirty="0" err="1"/>
+              <a:t>dest</a:t>
+            </a:r>
+            <a:r>
+              <a:rPr lang="en-US" dirty="0"/>
+              <a:t> port, </a:t>
+            </a:r>
+            <a:r>
+              <a:rPr lang="en-US" u="sng" dirty="0"/>
+              <a:t>and</a:t>
+            </a:r>
+            <a:r>
+              <a:rPr lang="en-US" dirty="0"/>
+              <a:t> the </a:t>
+            </a:r>
+            <a:r>
+              <a:rPr lang="en-US" dirty="0" err="1"/>
+              <a:t>acl_id</a:t>
+            </a:r>
+            <a:r>
+              <a:rPr lang="en-US" dirty="0"/>
+              <a:t> obtained from earlier </a:t>
+            </a:r>
+            <a:r>
+              <a:rPr lang="en-US" dirty="0" err="1"/>
+              <a:t>port_to_acl_id</a:t>
+            </a:r>
+            <a:r>
+              <a:rPr lang="en-US" dirty="0"/>
+              <a:t> result.</a:t>
+            </a:r>
+          </a:p>
+        </p:txBody>
+      </p:sp>
+    </p:spTree>
+    <p:extLst>
+      <p:ext uri="{BB962C8B-B14F-4D97-AF65-F5344CB8AC3E}">
+        <p14:creationId xmlns:p14="http://schemas.microsoft.com/office/powerpoint/2010/main" val="1476690793"/>
+      </p:ext>
+    </p:extLst>
+  </p:cSld>
+  <p:clrMapOvr>
+    <a:masterClrMapping/>
+  </p:clrMapOvr>
+</p:sld>
+</file>
+
+<file path=ppt/slides/slide13.xml><?xml version="1.0" encoding="utf-8"?>
+<p:sld xmlns:a="http://schemas.openxmlformats.org/drawingml/2006/main" xmlns:r="http://schemas.openxmlformats.org/officeDocument/2006/relationships" xmlns:p="http://schemas.openxmlformats.org/presentationml/2006/main">
+  <p:cSld>
+    <p:spTree>
+      <p:nvGrpSpPr>
+        <p:cNvPr id="1" name=""/>
+        <p:cNvGrpSpPr/>
+        <p:nvPr/>
+      </p:nvGrpSpPr>
+      <p:grpSpPr>
+        <a:xfrm>
+          <a:off x="0" y="0"/>
+          <a:ext cx="0" cy="0"/>
+          <a:chOff x="0" y="0"/>
+          <a:chExt cx="0" cy="0"/>
+        </a:xfrm>
+      </p:grpSpPr>
+      <p:sp>
+        <p:nvSpPr>
+          <p:cNvPr id="2" name="Title 1">
+            <a:extLst>
+              <a:ext uri="{FF2B5EF4-FFF2-40B4-BE49-F238E27FC236}">
+                <a16:creationId xmlns:a16="http://schemas.microsoft.com/office/drawing/2014/main" id="{28C57A9B-F0B1-8648-B1DE-8B7923B2CC3A}"/>
+              </a:ext>
+            </a:extLst>
+          </p:cNvPr>
+          <p:cNvSpPr>
+            <a:spLocks noGrp="1"/>
+          </p:cNvSpPr>
+          <p:nvPr>
+            <p:ph type="title"/>
+          </p:nvPr>
+        </p:nvSpPr>
+        <p:spPr/>
+        <p:txBody>
+          <a:bodyPr/>
+          <a:lstStyle/>
+          <a:p>
+            <a:r>
+              <a:rPr lang="en-US" dirty="0"/>
+              <a:t>Pointer-flipping for ACL scenario (2)</a:t>
+            </a:r>
+          </a:p>
+        </p:txBody>
+      </p:sp>
+      <p:sp>
+        <p:nvSpPr>
+          <p:cNvPr id="3" name="Content Placeholder 2">
+            <a:extLst>
+              <a:ext uri="{FF2B5EF4-FFF2-40B4-BE49-F238E27FC236}">
+                <a16:creationId xmlns:a16="http://schemas.microsoft.com/office/drawing/2014/main" id="{43D69AC8-C779-5D46-A687-143EF8F24AE1}"/>
+              </a:ext>
+            </a:extLst>
+          </p:cNvPr>
+          <p:cNvSpPr>
+            <a:spLocks noGrp="1"/>
+          </p:cNvSpPr>
+          <p:nvPr>
+            <p:ph idx="1"/>
+          </p:nvPr>
+        </p:nvSpPr>
+        <p:spPr/>
+        <p:txBody>
+          <a:bodyPr>
+            <a:normAutofit fontScale="92500" lnSpcReduction="20000"/>
+          </a:bodyPr>
+          <a:lstStyle/>
+          <a:p>
+            <a:r>
+              <a:rPr lang="en-US" dirty="0"/>
+              <a:t>On attempted </a:t>
+            </a:r>
+            <a:r>
+              <a:rPr lang="en-US" dirty="0" err="1"/>
+              <a:t>config</a:t>
+            </a:r>
+            <a:r>
+              <a:rPr lang="en-US" dirty="0"/>
+              <a:t> change of port P to use ‘</a:t>
+            </a:r>
+            <a:r>
+              <a:rPr lang="en-US" dirty="0" err="1"/>
+              <a:t>new_acl</a:t>
+            </a:r>
+            <a:r>
+              <a:rPr lang="en-US" dirty="0"/>
+              <a:t>’, control plane can do these things:</a:t>
+            </a:r>
+          </a:p>
+          <a:p>
+            <a:pPr lvl="1"/>
+            <a:r>
+              <a:rPr lang="en-US" dirty="0"/>
+              <a:t>In controller, dynamically allocate a new </a:t>
+            </a:r>
+            <a:r>
+              <a:rPr lang="en-US" dirty="0" err="1"/>
+              <a:t>acl_id</a:t>
+            </a:r>
+            <a:r>
+              <a:rPr lang="en-US" dirty="0"/>
+              <a:t> A, not currently in use in the data plane for any port.</a:t>
+            </a:r>
+          </a:p>
+          <a:p>
+            <a:pPr lvl="1"/>
+            <a:r>
+              <a:rPr lang="en-US" dirty="0"/>
+              <a:t>Add new entries to table ‘</a:t>
+            </a:r>
+            <a:r>
+              <a:rPr lang="en-US" dirty="0" err="1"/>
+              <a:t>acl_lookup</a:t>
+            </a:r>
+            <a:r>
+              <a:rPr lang="en-US" dirty="0"/>
+              <a:t>’, all with </a:t>
+            </a:r>
+            <a:r>
+              <a:rPr lang="en-US" dirty="0" err="1"/>
+              <a:t>acl_id</a:t>
+            </a:r>
+            <a:r>
+              <a:rPr lang="en-US" dirty="0"/>
+              <a:t> A.</a:t>
+            </a:r>
+          </a:p>
+          <a:p>
+            <a:pPr lvl="2"/>
+            <a:r>
+              <a:rPr lang="en-US" dirty="0"/>
+              <a:t>Note that these could use a batch operation with an arbitrary order of committing to the data plane.  None of them can be matched by any packets.</a:t>
+            </a:r>
+          </a:p>
+          <a:p>
+            <a:pPr lvl="2"/>
+            <a:r>
+              <a:rPr lang="en-US" dirty="0"/>
+              <a:t>On failure, issue another batch operation to remove any subset of the entries that were successfully added, and fail the configuration change.  Note: Removes should never fail.</a:t>
+            </a:r>
+          </a:p>
+          <a:p>
+            <a:pPr lvl="1"/>
+            <a:r>
+              <a:rPr lang="en-US" dirty="0"/>
+              <a:t>If all added successfully, modify table ‘</a:t>
+            </a:r>
+            <a:r>
+              <a:rPr lang="en-US" dirty="0" err="1"/>
+              <a:t>port_to_acl_id</a:t>
+            </a:r>
+            <a:r>
+              <a:rPr lang="en-US" dirty="0"/>
+              <a:t>’ entry for port P so that packets from that port will now get </a:t>
+            </a:r>
+            <a:r>
+              <a:rPr lang="en-US" dirty="0" err="1"/>
+              <a:t>acl_id</a:t>
+            </a:r>
+            <a:r>
+              <a:rPr lang="en-US" dirty="0"/>
+              <a:t> A.</a:t>
+            </a:r>
+          </a:p>
+          <a:p>
+            <a:pPr lvl="1"/>
+            <a:r>
+              <a:rPr lang="en-US" dirty="0"/>
+              <a:t>Next packet to access table </a:t>
+            </a:r>
+            <a:r>
+              <a:rPr lang="en-US" dirty="0" err="1"/>
+              <a:t>port_to_acl_id</a:t>
+            </a:r>
+            <a:r>
+              <a:rPr lang="en-US" dirty="0"/>
+              <a:t>, and all after that, will start matching using the new ‘</a:t>
+            </a:r>
+            <a:r>
+              <a:rPr lang="en-US" dirty="0" err="1"/>
+              <a:t>acl_lookup</a:t>
+            </a:r>
+            <a:r>
+              <a:rPr lang="en-US" dirty="0"/>
+              <a:t>’ entries with </a:t>
+            </a:r>
+            <a:r>
+              <a:rPr lang="en-US" dirty="0" err="1"/>
+              <a:t>acl_id</a:t>
+            </a:r>
+            <a:r>
+              <a:rPr lang="en-US" dirty="0"/>
+              <a:t> A, not the old set.</a:t>
+            </a:r>
+          </a:p>
+          <a:p>
+            <a:pPr lvl="1"/>
+            <a:r>
+              <a:rPr lang="en-US" dirty="0"/>
+              <a:t>If the old </a:t>
+            </a:r>
+            <a:r>
+              <a:rPr lang="en-US" dirty="0" err="1"/>
+              <a:t>acl_id</a:t>
+            </a:r>
+            <a:r>
+              <a:rPr lang="en-US" dirty="0"/>
+              <a:t> for port P is not used by any other port, then after a short time (when the last packet that got the old </a:t>
+            </a:r>
+            <a:r>
+              <a:rPr lang="en-US" dirty="0" err="1"/>
+              <a:t>acl_id</a:t>
+            </a:r>
+            <a:r>
+              <a:rPr lang="en-US" dirty="0"/>
+              <a:t>) has left the system, safe to delete all ‘</a:t>
+            </a:r>
+            <a:r>
+              <a:rPr lang="en-US" dirty="0" err="1"/>
+              <a:t>acl_lookup</a:t>
+            </a:r>
+            <a:r>
+              <a:rPr lang="en-US" dirty="0"/>
+              <a:t>’ entries that have that old </a:t>
+            </a:r>
+            <a:r>
+              <a:rPr lang="en-US" dirty="0" err="1"/>
+              <a:t>acl_id</a:t>
+            </a:r>
+            <a:r>
+              <a:rPr lang="en-US" dirty="0"/>
+              <a:t>.</a:t>
+            </a:r>
+          </a:p>
+        </p:txBody>
+      </p:sp>
+    </p:spTree>
+    <p:extLst>
+      <p:ext uri="{BB962C8B-B14F-4D97-AF65-F5344CB8AC3E}">
+        <p14:creationId xmlns:p14="http://schemas.microsoft.com/office/powerpoint/2010/main" val="789349896"/>
+      </p:ext>
+    </p:extLst>
+  </p:cSld>
+  <p:clrMapOvr>
+    <a:masterClrMapping/>
+  </p:clrMapOvr>
+</p:sld>
+</file>
+
+<file path=ppt/slides/slide14.xml><?xml version="1.0" encoding="utf-8"?>
+<p:sld xmlns:a="http://schemas.openxmlformats.org/drawingml/2006/main" xmlns:r="http://schemas.openxmlformats.org/officeDocument/2006/relationships" xmlns:p="http://schemas.openxmlformats.org/presentationml/2006/main">
+  <p:cSld>
+    <p:spTree>
+      <p:nvGrpSpPr>
+        <p:cNvPr id="1" name=""/>
+        <p:cNvGrpSpPr/>
+        <p:nvPr/>
+      </p:nvGrpSpPr>
+      <p:grpSpPr>
+        <a:xfrm>
+          <a:off x="0" y="0"/>
+          <a:ext cx="0" cy="0"/>
+          <a:chOff x="0" y="0"/>
+          <a:chExt cx="0" cy="0"/>
+        </a:xfrm>
+      </p:grpSpPr>
+      <p:sp>
+        <p:nvSpPr>
+          <p:cNvPr id="2" name="Title 1">
+            <a:extLst>
+              <a:ext uri="{FF2B5EF4-FFF2-40B4-BE49-F238E27FC236}">
+                <a16:creationId xmlns:a16="http://schemas.microsoft.com/office/drawing/2014/main" id="{8B00A46C-650C-F246-8FEF-811A6A871BFB}"/>
+              </a:ext>
+            </a:extLst>
+          </p:cNvPr>
+          <p:cNvSpPr>
+            <a:spLocks noGrp="1"/>
+          </p:cNvSpPr>
+          <p:nvPr>
+            <p:ph type="title"/>
+          </p:nvPr>
+        </p:nvSpPr>
+        <p:spPr/>
+        <p:txBody>
+          <a:bodyPr/>
+          <a:lstStyle/>
+          <a:p>
+            <a:endParaRPr lang="en-US" dirty="0"/>
+          </a:p>
+        </p:txBody>
+      </p:sp>
+      <p:sp>
+        <p:nvSpPr>
+          <p:cNvPr id="3" name="Content Placeholder 2">
+            <a:extLst>
+              <a:ext uri="{FF2B5EF4-FFF2-40B4-BE49-F238E27FC236}">
+                <a16:creationId xmlns:a16="http://schemas.microsoft.com/office/drawing/2014/main" id="{CE3E3960-341A-764D-9B48-34263822715F}"/>
+              </a:ext>
+            </a:extLst>
+          </p:cNvPr>
+          <p:cNvSpPr>
+            <a:spLocks noGrp="1"/>
+          </p:cNvSpPr>
+          <p:nvPr>
+            <p:ph idx="1"/>
+          </p:nvPr>
+        </p:nvSpPr>
+        <p:spPr/>
+        <p:txBody>
+          <a:bodyPr>
+            <a:normAutofit fontScale="92500" lnSpcReduction="10000"/>
+          </a:bodyPr>
+          <a:lstStyle/>
+          <a:p>
+            <a:r>
+              <a:rPr lang="en-US" dirty="0"/>
+              <a:t>Note: This technique is very general, but I don’t know how to automate it for an arbitrary P4 program.</a:t>
+            </a:r>
+          </a:p>
+          <a:p>
+            <a:pPr lvl="1"/>
+            <a:r>
+              <a:rPr lang="en-US" dirty="0"/>
+              <a:t>It might not even be possible: a P4 program that did not have a table that mapped </a:t>
+            </a:r>
+            <a:r>
+              <a:rPr lang="en-US" dirty="0" err="1"/>
+              <a:t>ingress_port</a:t>
+            </a:r>
+            <a:r>
+              <a:rPr lang="en-US" dirty="0"/>
+              <a:t> to </a:t>
+            </a:r>
+            <a:r>
+              <a:rPr lang="en-US" dirty="0" err="1"/>
+              <a:t>acl_id</a:t>
+            </a:r>
+            <a:r>
+              <a:rPr lang="en-US" dirty="0"/>
+              <a:t>, and used </a:t>
+            </a:r>
+            <a:r>
+              <a:rPr lang="en-US" dirty="0" err="1"/>
+              <a:t>ingress_port</a:t>
+            </a:r>
+            <a:r>
+              <a:rPr lang="en-US" dirty="0"/>
+              <a:t> instead of </a:t>
+            </a:r>
+            <a:r>
+              <a:rPr lang="en-US" dirty="0" err="1"/>
+              <a:t>acl_id</a:t>
+            </a:r>
+            <a:r>
+              <a:rPr lang="en-US" dirty="0"/>
+              <a:t> as a key in the ‘</a:t>
+            </a:r>
+            <a:r>
+              <a:rPr lang="en-US" dirty="0" err="1"/>
+              <a:t>acl_lookup</a:t>
+            </a:r>
+            <a:r>
+              <a:rPr lang="en-US" dirty="0"/>
+              <a:t>’, would </a:t>
+            </a:r>
+            <a:r>
+              <a:rPr lang="en-US" u="sng" dirty="0"/>
+              <a:t>not</a:t>
+            </a:r>
+            <a:r>
+              <a:rPr lang="en-US" dirty="0"/>
+              <a:t> be able to perform this update atomically.</a:t>
+            </a:r>
+          </a:p>
+          <a:p>
+            <a:pPr lvl="1"/>
+            <a:r>
+              <a:rPr lang="en-US" dirty="0"/>
+              <a:t>When it is possible, I know of no automated way to detect it.</a:t>
+            </a:r>
+          </a:p>
+          <a:p>
+            <a:pPr lvl="1"/>
+            <a:r>
+              <a:rPr lang="en-US" dirty="0"/>
+              <a:t>How do people survive doing these kinds of things?  By creating an ad hoc solution for each case that it matters.</a:t>
+            </a:r>
+          </a:p>
+          <a:p>
+            <a:pPr lvl="1"/>
+            <a:r>
+              <a:rPr lang="en-US" dirty="0"/>
+              <a:t>They are all similar, but so are a lot of other kinds of programs that we write in ad hoc fashion following a well known pattern or style.</a:t>
+            </a:r>
+          </a:p>
+          <a:p>
+            <a:r>
+              <a:rPr lang="en-US" dirty="0"/>
+              <a:t>Not all use cases _need_ atomic batch updates.</a:t>
+            </a:r>
+          </a:p>
+          <a:p>
+            <a:pPr lvl="1"/>
+            <a:r>
+              <a:rPr lang="en-US" dirty="0"/>
+              <a:t>By far the common case for IP route lookups is to do them one at a time, succeeding or failing independently on each one.</a:t>
+            </a:r>
+          </a:p>
+        </p:txBody>
+      </p:sp>
+    </p:spTree>
+    <p:extLst>
+      <p:ext uri="{BB962C8B-B14F-4D97-AF65-F5344CB8AC3E}">
+        <p14:creationId xmlns:p14="http://schemas.microsoft.com/office/powerpoint/2010/main" val="4204189054"/>
+      </p:ext>
+    </p:extLst>
+  </p:cSld>
+  <p:clrMapOvr>
+    <a:masterClrMapping/>
+  </p:clrMapOvr>
+</p:sld>
+</file>
+
 <file path=ppt/slides/slide2.xml><?xml version="1.0" encoding="utf-8"?>
 <p:sld xmlns:a="http://schemas.openxmlformats.org/drawingml/2006/main" xmlns:r="http://schemas.openxmlformats.org/officeDocument/2006/relationships" xmlns:p="http://schemas.openxmlformats.org/presentationml/2006/main">
   <p:cSld>
@@ -3523,7 +4473,7 @@
             </a:r>
             <a:r>
               <a:rPr lang="en-US" dirty="0"/>
-              <a:t> it be, or contain, a transactional database.</a:t>
+              <a:t> it to be, or contain, a transactional database.</a:t>
             </a:r>
           </a:p>
         </p:txBody>
@@ -3696,7 +4646,9 @@
         </p:nvSpPr>
         <p:spPr/>
         <p:txBody>
-          <a:bodyPr/>
+          <a:bodyPr>
+            <a:normAutofit lnSpcReduction="10000"/>
+          </a:bodyPr>
           <a:lstStyle/>
           <a:p>
             <a:r>
@@ -3708,21 +4660,27 @@
             <a:pPr lvl="1"/>
             <a:r>
               <a:rPr lang="en-US" dirty="0"/>
-              <a:t>(a) Stop immediately if one operation fails, ignoring any operations in the batch after that.  Return error status and which operation failed.</a:t>
-            </a:r>
-          </a:p>
-          <a:p>
-            <a:pPr lvl="1"/>
-            <a:r>
-              <a:rPr lang="en-US" dirty="0"/>
-              <a:t>(b) Continue with the sequence regardless of which ones might fail.  Return error status listing which operations failed.</a:t>
-            </a:r>
-          </a:p>
-          <a:p>
-            <a:pPr lvl="1"/>
-            <a:r>
-              <a:rPr lang="en-US" dirty="0"/>
-              <a:t>(c) Execute them in an arbitrary order, returning error status listing any that failed.  (Some PSA implementations might be able to implement this more efficiently if the order they commit to the data plane is different than the controller gave.)</a:t>
+              <a:t>(a) “in-order-stop-on-first-failure”: Stop immediately if one operation fails, ignoring any operations in the batch after that.  Return error status and which operation failed.</a:t>
+            </a:r>
+          </a:p>
+          <a:p>
+            <a:pPr lvl="1"/>
+            <a:r>
+              <a:rPr lang="en-US" dirty="0"/>
+              <a:t>(b) “in-order-continue-on-failure”: Continue with the sequence regardless of which ones fail.  Return error status listing which operations failed.</a:t>
+            </a:r>
+          </a:p>
+          <a:p>
+            <a:r>
+              <a:rPr lang="en-US" dirty="0"/>
+              <a:t>Execute them in an arbitrary order as a non-atomic batch</a:t>
+            </a:r>
+          </a:p>
+          <a:p>
+            <a:pPr lvl="1"/>
+            <a:r>
+              <a:rPr lang="en-US" dirty="0"/>
+              <a:t>(c) “arbitrary-order-continue-on-failure”: Return error status listing any that failed.  Rationale: Some PSA implementations might be able to implement this more efficiently than in-order-continue-on-failure, if the order they commit to the data plane is different than the controller gave.</a:t>
             </a:r>
           </a:p>
           <a:p>
@@ -3843,8 +4801,13 @@
             <a:pPr lvl="1"/>
             <a:r>
               <a:rPr lang="en-US" dirty="0"/>
-              <a:t>Details upon request – no slides for that yet.</a:t>
-            </a:r>
+              <a:t>See “Atomic switch from old ACL to new ACL” slide later for </a:t>
+            </a:r>
+            <a:r>
+              <a:rPr lang="en-US"/>
+              <a:t>an example.</a:t>
+            </a:r>
+            <a:endParaRPr lang="en-US" dirty="0"/>
           </a:p>
           <a:p>
             <a:pPr lvl="1"/>
@@ -4105,7 +5068,7 @@
           <a:p>
             <a:r>
               <a:rPr lang="en-US" dirty="0"/>
-              <a:t>Easy-to-implement all-or-none batch</a:t>
+              <a:t>Easy-to-implement “all-or-none” batch</a:t>
             </a:r>
           </a:p>
         </p:txBody>
@@ -4162,15 +5125,7 @@
             </a:r>
             <a:r>
               <a:rPr lang="en-US" dirty="0"/>
-              <a:t> set of final resulting states as you can be in when you </a:t>
-            </a:r>
-            <a:r>
-              <a:rPr lang="en-US"/>
-              <a:t>use the </a:t>
-            </a:r>
-            <a:r>
-              <a:rPr lang="en-US" dirty="0"/>
-              <a:t>“stop on first error” mode</a:t>
+              <a:t> set of final resulting states as you can be in when you use the in-order-stop-on-first-failure mode</a:t>
             </a:r>
           </a:p>
           <a:p>
@@ -4195,18 +5150,15 @@
             <a:pPr lvl="2"/>
             <a:r>
               <a:rPr lang="en-US" dirty="0"/>
-              <a:t>Try op</a:t>
+              <a:t>try op</a:t>
             </a:r>
           </a:p>
           <a:p>
             <a:pPr lvl="2"/>
             <a:r>
               <a:rPr lang="en-US" dirty="0"/>
-              <a:t>if op fails:</a:t>
-            </a:r>
-          </a:p>
-          <a:p>
-            <a:pPr lvl="3"/>
+              <a:t>if (op fails) </a:t>
+            </a:r>
             <a:r>
               <a:rPr lang="en-US" dirty="0" err="1"/>
               <a:t>goto</a:t>
@@ -4229,6 +5181,10 @@
           </a:p>
           <a:p>
             <a:pPr lvl="1"/>
+            <a:endParaRPr lang="en-US" u="sng" dirty="0"/>
+          </a:p>
+          <a:p>
+            <a:pPr lvl="1"/>
             <a:r>
               <a:rPr lang="en-US" u="sng" dirty="0"/>
               <a:t>ROLLBACK</a:t>
@@ -4280,18 +5236,15 @@
             <a:pPr lvl="2"/>
             <a:r>
               <a:rPr lang="en-US" dirty="0"/>
-              <a:t>Try “opposite of op”   (i.e. if op is add, do the corresponding remove.  If op is remove, do corresponding add)</a:t>
+              <a:t>try “opposite of op”   (i.e. if op is add, do the corresponding remove.  If op is remove, do corresponding add)</a:t>
             </a:r>
           </a:p>
           <a:p>
             <a:pPr lvl="2"/>
             <a:r>
               <a:rPr lang="en-US" dirty="0"/>
-              <a:t>if op fails:</a:t>
-            </a:r>
-          </a:p>
-          <a:p>
-            <a:pPr lvl="3"/>
+              <a:t>if (op fails) </a:t>
+            </a:r>
             <a:r>
               <a:rPr lang="en-US" dirty="0" err="1"/>
               <a:t>goto</a:t>
@@ -4309,8 +5262,20 @@
             <a:pPr lvl="1"/>
             <a:r>
               <a:rPr lang="en-US" dirty="0"/>
-              <a:t>return failure;  (this kind of failure means everything was successfully undone)</a:t>
-            </a:r>
+              <a:t>return </a:t>
+            </a:r>
+            <a:r>
+              <a:rPr lang="en-US" dirty="0" err="1"/>
+              <a:t>failure_and_rollback_succeeded</a:t>
+            </a:r>
+            <a:r>
+              <a:rPr lang="en-US" dirty="0"/>
+              <a:t>;  (this kind of failure means everything was successfully undone)</a:t>
+            </a:r>
+          </a:p>
+          <a:p>
+            <a:pPr lvl="1"/>
+            <a:endParaRPr lang="en-US" u="sng" dirty="0"/>
           </a:p>
           <a:p>
             <a:pPr lvl="1"/>
@@ -4334,14 +5299,15 @@
             <a:pPr lvl="1"/>
             <a:r>
               <a:rPr lang="en-US" dirty="0"/>
-              <a:t>// Does a controller want to use an operation like this?</a:t>
-            </a:r>
-          </a:p>
-          <a:p>
-            <a:pPr lvl="1"/>
-            <a:r>
-              <a:rPr lang="en-US" dirty="0"/>
-              <a:t>// It will be responsible for dealing with the data plane in the resulting state where the batch is partially applied.</a:t>
+              <a:t>return </a:t>
+            </a:r>
+            <a:r>
+              <a:rPr lang="en-US" dirty="0" err="1"/>
+              <a:t>failure_and_rollback_failed</a:t>
+            </a:r>
+            <a:r>
+              <a:rPr lang="en-US" dirty="0"/>
+              <a:t>;</a:t>
             </a:r>
           </a:p>
         </p:txBody>
@@ -4432,7 +5398,7 @@
         </p:spPr>
         <p:txBody>
           <a:bodyPr>
-            <a:normAutofit fontScale="55000" lnSpcReduction="20000"/>
+            <a:normAutofit fontScale="47500" lnSpcReduction="20000"/>
           </a:bodyPr>
           <a:lstStyle/>
           <a:p>
@@ -4475,6 +5441,17 @@
           <a:p>
             <a:pPr lvl="1"/>
             <a:r>
+              <a:rPr lang="en-US" dirty="0" err="1"/>
+              <a:t>ret_status</a:t>
+            </a:r>
+            <a:r>
+              <a:rPr lang="en-US" dirty="0"/>
+              <a:t> = SUCCESS;</a:t>
+            </a:r>
+          </a:p>
+          <a:p>
+            <a:pPr lvl="1"/>
+            <a:r>
               <a:rPr lang="en-US" dirty="0"/>
               <a:t>Make a snapshot of current contents of all tables (e.g. a complete copy, or use persistent data structures to avoid needing to make a complete copy)</a:t>
             </a:r>
@@ -4513,18 +5490,15 @@
             <a:pPr lvl="2"/>
             <a:r>
               <a:rPr lang="en-US" dirty="0"/>
-              <a:t>Try op</a:t>
+              <a:t>try op</a:t>
             </a:r>
           </a:p>
           <a:p>
             <a:pPr lvl="2"/>
             <a:r>
               <a:rPr lang="en-US" dirty="0"/>
-              <a:t>if op fails:</a:t>
-            </a:r>
-          </a:p>
-          <a:p>
-            <a:pPr lvl="3"/>
+              <a:t>if (op fails) </a:t>
+            </a:r>
             <a:r>
               <a:rPr lang="en-US" dirty="0" err="1"/>
               <a:t>goto</a:t>
@@ -4566,8 +5540,23 @@
           <a:p>
             <a:pPr lvl="1"/>
             <a:r>
-              <a:rPr lang="en-US" dirty="0"/>
-              <a:t>FAIL:</a:t>
+              <a:rPr lang="en-US" u="sng" dirty="0"/>
+              <a:t>FAIL</a:t>
+            </a:r>
+            <a:r>
+              <a:rPr lang="en-US" dirty="0"/>
+              <a:t>:</a:t>
+            </a:r>
+          </a:p>
+          <a:p>
+            <a:pPr lvl="1"/>
+            <a:r>
+              <a:rPr lang="en-US" dirty="0" err="1"/>
+              <a:t>ret_status</a:t>
+            </a:r>
+            <a:r>
+              <a:rPr lang="en-US" dirty="0"/>
+              <a:t> = FAILURE;</a:t>
             </a:r>
           </a:p>
           <a:p>
@@ -4591,8 +5580,12 @@
           <a:p>
             <a:pPr lvl="1"/>
             <a:r>
-              <a:rPr lang="en-US" dirty="0"/>
-              <a:t>CLEANUP:</a:t>
+              <a:rPr lang="en-US" u="sng" dirty="0"/>
+              <a:t>CLEANUP</a:t>
+            </a:r>
+            <a:r>
+              <a:rPr lang="en-US" dirty="0"/>
+              <a:t>:</a:t>
             </a:r>
           </a:p>
           <a:p>
@@ -4603,8 +5596,19 @@
             </a:r>
           </a:p>
           <a:p>
-            <a:pPr lvl="2"/>
-            <a:endParaRPr lang="en-US" dirty="0"/>
+            <a:pPr lvl="1"/>
+            <a:r>
+              <a:rPr lang="en-US" dirty="0"/>
+              <a:t>return </a:t>
+            </a:r>
+            <a:r>
+              <a:rPr lang="en-US" dirty="0" err="1"/>
+              <a:t>ret_status</a:t>
+            </a:r>
+            <a:r>
+              <a:rPr lang="en-US" dirty="0"/>
+              <a:t>;</a:t>
+            </a:r>
           </a:p>
         </p:txBody>
       </p:sp>

</xml_diff>

<commit_message>
Add batch mode 'arbitrary-order-stop-on-first-failure'
and a few other minor edits, most major of which was mentioning that
another general technique of implementing atomic batch updates is
stopping traffic.
</commit_message>
<xml_diff>
--- a/docs/p4runtime api batch operations.pptx
+++ b/docs/p4runtime api batch operations.pptx
@@ -272,7 +272,7 @@
           <a:p>
             <a:fld id="{990A195E-A484-2346-BD18-6F71FF1F2709}" type="datetimeFigureOut">
               <a:rPr lang="en-US" smtClean="0"/>
-              <a:t>2/21/18</a:t>
+              <a:t>2/22/18</a:t>
             </a:fld>
             <a:endParaRPr lang="en-US"/>
           </a:p>
@@ -470,7 +470,7 @@
           <a:p>
             <a:fld id="{990A195E-A484-2346-BD18-6F71FF1F2709}" type="datetimeFigureOut">
               <a:rPr lang="en-US" smtClean="0"/>
-              <a:t>2/21/18</a:t>
+              <a:t>2/22/18</a:t>
             </a:fld>
             <a:endParaRPr lang="en-US"/>
           </a:p>
@@ -678,7 +678,7 @@
           <a:p>
             <a:fld id="{990A195E-A484-2346-BD18-6F71FF1F2709}" type="datetimeFigureOut">
               <a:rPr lang="en-US" smtClean="0"/>
-              <a:t>2/21/18</a:t>
+              <a:t>2/22/18</a:t>
             </a:fld>
             <a:endParaRPr lang="en-US"/>
           </a:p>
@@ -876,7 +876,7 @@
           <a:p>
             <a:fld id="{990A195E-A484-2346-BD18-6F71FF1F2709}" type="datetimeFigureOut">
               <a:rPr lang="en-US" smtClean="0"/>
-              <a:t>2/21/18</a:t>
+              <a:t>2/22/18</a:t>
             </a:fld>
             <a:endParaRPr lang="en-US"/>
           </a:p>
@@ -1151,7 +1151,7 @@
           <a:p>
             <a:fld id="{990A195E-A484-2346-BD18-6F71FF1F2709}" type="datetimeFigureOut">
               <a:rPr lang="en-US" smtClean="0"/>
-              <a:t>2/21/18</a:t>
+              <a:t>2/22/18</a:t>
             </a:fld>
             <a:endParaRPr lang="en-US"/>
           </a:p>
@@ -1416,7 +1416,7 @@
           <a:p>
             <a:fld id="{990A195E-A484-2346-BD18-6F71FF1F2709}" type="datetimeFigureOut">
               <a:rPr lang="en-US" smtClean="0"/>
-              <a:t>2/21/18</a:t>
+              <a:t>2/22/18</a:t>
             </a:fld>
             <a:endParaRPr lang="en-US"/>
           </a:p>
@@ -1828,7 +1828,7 @@
           <a:p>
             <a:fld id="{990A195E-A484-2346-BD18-6F71FF1F2709}" type="datetimeFigureOut">
               <a:rPr lang="en-US" smtClean="0"/>
-              <a:t>2/21/18</a:t>
+              <a:t>2/22/18</a:t>
             </a:fld>
             <a:endParaRPr lang="en-US"/>
           </a:p>
@@ -1969,7 +1969,7 @@
           <a:p>
             <a:fld id="{990A195E-A484-2346-BD18-6F71FF1F2709}" type="datetimeFigureOut">
               <a:rPr lang="en-US" smtClean="0"/>
-              <a:t>2/21/18</a:t>
+              <a:t>2/22/18</a:t>
             </a:fld>
             <a:endParaRPr lang="en-US"/>
           </a:p>
@@ -2082,7 +2082,7 @@
           <a:p>
             <a:fld id="{990A195E-A484-2346-BD18-6F71FF1F2709}" type="datetimeFigureOut">
               <a:rPr lang="en-US" smtClean="0"/>
-              <a:t>2/21/18</a:t>
+              <a:t>2/22/18</a:t>
             </a:fld>
             <a:endParaRPr lang="en-US"/>
           </a:p>
@@ -2393,7 +2393,7 @@
           <a:p>
             <a:fld id="{990A195E-A484-2346-BD18-6F71FF1F2709}" type="datetimeFigureOut">
               <a:rPr lang="en-US" smtClean="0"/>
-              <a:t>2/21/18</a:t>
+              <a:t>2/22/18</a:t>
             </a:fld>
             <a:endParaRPr lang="en-US"/>
           </a:p>
@@ -2681,7 +2681,7 @@
           <a:p>
             <a:fld id="{990A195E-A484-2346-BD18-6F71FF1F2709}" type="datetimeFigureOut">
               <a:rPr lang="en-US" smtClean="0"/>
-              <a:t>2/21/18</a:t>
+              <a:t>2/22/18</a:t>
             </a:fld>
             <a:endParaRPr lang="en-US"/>
           </a:p>
@@ -2922,7 +2922,7 @@
           <a:p>
             <a:fld id="{990A195E-A484-2346-BD18-6F71FF1F2709}" type="datetimeFigureOut">
               <a:rPr lang="en-US" smtClean="0"/>
-              <a:t>2/21/18</a:t>
+              <a:t>2/22/18</a:t>
             </a:fld>
             <a:endParaRPr lang="en-US"/>
           </a:p>
@@ -3505,7 +3505,7 @@
           <a:p>
             <a:r>
               <a:rPr lang="en-US" dirty="0"/>
-              <a:t>Fleshed out example on next slide.</a:t>
+              <a:t>Fleshed out example starts on next slide.</a:t>
             </a:r>
           </a:p>
         </p:txBody>
@@ -4256,7 +4256,7 @@
         <p:spPr/>
         <p:txBody>
           <a:bodyPr>
-            <a:normAutofit fontScale="92500" lnSpcReduction="10000"/>
+            <a:normAutofit fontScale="85000" lnSpcReduction="20000"/>
           </a:bodyPr>
           <a:lstStyle/>
           <a:p>
@@ -4317,7 +4317,22 @@
             </a:r>
             <a:r>
               <a:rPr lang="en-US" dirty="0"/>
-              <a:t> be able to perform this update atomically.</a:t>
+              <a:t> be able to perform this update atomically</a:t>
+            </a:r>
+          </a:p>
+          <a:p>
+            <a:pPr lvl="2"/>
+            <a:r>
+              <a:rPr lang="en-US" dirty="0"/>
+              <a:t>Unless you pause or drop all traffic from port P while changing the </a:t>
+            </a:r>
+            <a:r>
+              <a:rPr lang="en-US" dirty="0" err="1"/>
+              <a:t>acl_lookup</a:t>
+            </a:r>
+            <a:r>
+              <a:rPr lang="en-US" dirty="0"/>
+              <a:t> entries for that port.  Stopping packet processing during updates from the control plane is another general technique, but one that people would often prefer to avoid using.</a:t>
             </a:r>
           </a:p>
           <a:p>
@@ -4344,7 +4359,15 @@
           <a:p>
             <a:r>
               <a:rPr lang="en-US" dirty="0"/>
-              <a:t>Not all use cases _need_ atomic batch updates.</a:t>
+              <a:t>Not all use cases </a:t>
+            </a:r>
+            <a:r>
+              <a:rPr lang="en-US" u="sng" dirty="0"/>
+              <a:t>need</a:t>
+            </a:r>
+            <a:r>
+              <a:rPr lang="en-US" dirty="0"/>
+              <a:t> atomic batch updates.</a:t>
             </a:r>
           </a:p>
           <a:p>
@@ -4647,7 +4670,7 @@
         <p:spPr/>
         <p:txBody>
           <a:bodyPr>
-            <a:normAutofit lnSpcReduction="10000"/>
+            <a:normAutofit fontScale="85000" lnSpcReduction="20000"/>
           </a:bodyPr>
           <a:lstStyle/>
           <a:p>
@@ -4680,7 +4703,21 @@
             <a:pPr lvl="1"/>
             <a:r>
               <a:rPr lang="en-US" dirty="0"/>
-              <a:t>(c) “arbitrary-order-continue-on-failure”: Return error status listing any that failed.  Rationale: Some PSA implementations might be able to implement this more efficiently than in-order-continue-on-failure, if the order they commit to the data plane is different than the controller gave.</a:t>
+              <a:t>Rationale: Some PSA implementations might be able to implement this more efficiently than in-order-continue-on-failure, if the order they commit to the data plane is different than the controller gave.</a:t>
+            </a:r>
+          </a:p>
+          <a:p>
+            <a:pPr lvl="1"/>
+            <a:r>
+              <a:rPr lang="en-US" dirty="0"/>
+              <a:t>(c) “arbitrary-order-continue-on-failure”: Return error status listing any that failed.</a:t>
+            </a:r>
+          </a:p>
+          <a:p>
+            <a:pPr lvl="1"/>
+            <a:r>
+              <a:rPr lang="en-US" dirty="0"/>
+              <a:t>(d) “arbitrary-order-stop-on-first-failure”: If there is a failure, there is no way to predict in advance which subset will be done and which will not.  Still potentially useful if the controller knows that this is OK for its use case, and they want to know about failures quickly because they plan to undo the partial effects if a failure occurs.</a:t>
             </a:r>
           </a:p>
           <a:p>
@@ -4801,13 +4838,8 @@
             <a:pPr lvl="1"/>
             <a:r>
               <a:rPr lang="en-US" dirty="0"/>
-              <a:t>See “Atomic switch from old ACL to new ACL” slide later for </a:t>
-            </a:r>
-            <a:r>
-              <a:rPr lang="en-US"/>
-              <a:t>an example.</a:t>
-            </a:r>
-            <a:endParaRPr lang="en-US" dirty="0"/>
+              <a:t>See “Atomic switch from old ACL to new ACL” slide later for an example.</a:t>
+            </a:r>
           </a:p>
           <a:p>
             <a:pPr lvl="1"/>
@@ -4820,7 +4852,15 @@
             <a:pPr lvl="1"/>
             <a:r>
               <a:rPr lang="en-US" dirty="0"/>
-              <a:t>Control plane code writers do it for _particular_ P4 programs frequently, though, with common ‘patterns’ existing for how, in any particular case.</a:t>
+              <a:t>Control plane code writers do it for </a:t>
+            </a:r>
+            <a:r>
+              <a:rPr lang="en-US" u="sng" dirty="0"/>
+              <a:t>particular</a:t>
+            </a:r>
+            <a:r>
+              <a:rPr lang="en-US" dirty="0"/>
+              <a:t> P4 programs frequently, though, with common ‘patterns’ existing for how, in any particular case.</a:t>
             </a:r>
           </a:p>
         </p:txBody>
@@ -5091,8 +5131,8 @@
         </p:nvSpPr>
         <p:spPr>
           <a:xfrm>
-            <a:off x="838200" y="1469571"/>
-            <a:ext cx="10515600" cy="4707392"/>
+            <a:off x="838200" y="1469570"/>
+            <a:ext cx="10515600" cy="4996543"/>
           </a:xfrm>
         </p:spPr>
         <p:txBody>
@@ -5292,7 +5332,14 @@
             <a:pPr lvl="1"/>
             <a:r>
               <a:rPr lang="en-US" dirty="0"/>
-              <a:t>// You may think this is impossible, but think about undoing removes on a hash table.  Are they guaranteed to be undone?</a:t>
+              <a:t>// You may think this is impossible, but think about undoing removes on a multi-way hash table.</a:t>
+            </a:r>
+          </a:p>
+          <a:p>
+            <a:pPr lvl="1"/>
+            <a:r>
+              <a:rPr lang="en-US" dirty="0"/>
+              <a:t>// Are they guaranteed to be undone?         [ Answer: No, they can fail. ]</a:t>
             </a:r>
           </a:p>
           <a:p>
@@ -5392,13 +5439,13 @@
         </p:nvSpPr>
         <p:spPr>
           <a:xfrm>
-            <a:off x="838200" y="1262744"/>
-            <a:ext cx="10515600" cy="5355770"/>
+            <a:off x="838200" y="1088571"/>
+            <a:ext cx="10515600" cy="5682343"/>
           </a:xfrm>
         </p:spPr>
         <p:txBody>
           <a:bodyPr>
-            <a:normAutofit fontScale="47500" lnSpcReduction="20000"/>
+            <a:normAutofit fontScale="55000" lnSpcReduction="20000"/>
           </a:bodyPr>
           <a:lstStyle/>
           <a:p>
@@ -5432,7 +5479,15 @@
             </a:r>
             <a:r>
               <a:rPr lang="en-US" dirty="0"/>
-              <a:t> more work to implement than the easy batch ops.  E.g. note that if you are doing statistics collection as a background task, you need to either suspend those, or make sure that they are using software state that matches the current hardware state, not the in-memory state that you are building up in memory before executing the writes or failing.</a:t>
+              <a:t> more work to implement than the easy batch ops.  If you are using an SDK, it might not even provide the hooks necessary to do this </a:t>
+            </a:r>
+            <a:r>
+              <a:rPr lang="en-US" u="sng" dirty="0"/>
+              <a:t>at all</a:t>
+            </a:r>
+            <a:r>
+              <a:rPr lang="en-US" dirty="0"/>
+              <a:t>.  E.g. note that if you are doing statistics collection as a background task, you need to either suspend those, or make sure that they are using software state that matches the current hardware state, not the in-memory state that you are building up in memory before executing the writes or failing.</a:t>
             </a:r>
           </a:p>
           <a:p>
@@ -5686,10 +5741,15 @@
             <p:ph idx="1"/>
           </p:nvPr>
         </p:nvSpPr>
-        <p:spPr/>
+        <p:spPr>
+          <a:xfrm>
+            <a:off x="838200" y="1600200"/>
+            <a:ext cx="10515600" cy="5018314"/>
+          </a:xfrm>
+        </p:spPr>
         <p:txBody>
           <a:bodyPr>
-            <a:normAutofit fontScale="55000" lnSpcReduction="20000"/>
+            <a:normAutofit fontScale="62500" lnSpcReduction="20000"/>
           </a:bodyPr>
           <a:lstStyle/>
           <a:p>

</xml_diff>

<commit_message>
Added to P4Runtime batch operation slides a cite of "Abstractions for Network Update" paper
</commit_message>
<xml_diff>
--- a/docs/p4runtime api batch operations.pptx
+++ b/docs/p4runtime api batch operations.pptx
@@ -272,7 +272,7 @@
           <a:p>
             <a:fld id="{990A195E-A484-2346-BD18-6F71FF1F2709}" type="datetimeFigureOut">
               <a:rPr lang="en-US" smtClean="0"/>
-              <a:t>2/22/18</a:t>
+              <a:t>7/3/18</a:t>
             </a:fld>
             <a:endParaRPr lang="en-US"/>
           </a:p>
@@ -470,7 +470,7 @@
           <a:p>
             <a:fld id="{990A195E-A484-2346-BD18-6F71FF1F2709}" type="datetimeFigureOut">
               <a:rPr lang="en-US" smtClean="0"/>
-              <a:t>2/22/18</a:t>
+              <a:t>7/3/18</a:t>
             </a:fld>
             <a:endParaRPr lang="en-US"/>
           </a:p>
@@ -678,7 +678,7 @@
           <a:p>
             <a:fld id="{990A195E-A484-2346-BD18-6F71FF1F2709}" type="datetimeFigureOut">
               <a:rPr lang="en-US" smtClean="0"/>
-              <a:t>2/22/18</a:t>
+              <a:t>7/3/18</a:t>
             </a:fld>
             <a:endParaRPr lang="en-US"/>
           </a:p>
@@ -876,7 +876,7 @@
           <a:p>
             <a:fld id="{990A195E-A484-2346-BD18-6F71FF1F2709}" type="datetimeFigureOut">
               <a:rPr lang="en-US" smtClean="0"/>
-              <a:t>2/22/18</a:t>
+              <a:t>7/3/18</a:t>
             </a:fld>
             <a:endParaRPr lang="en-US"/>
           </a:p>
@@ -1151,7 +1151,7 @@
           <a:p>
             <a:fld id="{990A195E-A484-2346-BD18-6F71FF1F2709}" type="datetimeFigureOut">
               <a:rPr lang="en-US" smtClean="0"/>
-              <a:t>2/22/18</a:t>
+              <a:t>7/3/18</a:t>
             </a:fld>
             <a:endParaRPr lang="en-US"/>
           </a:p>
@@ -1416,7 +1416,7 @@
           <a:p>
             <a:fld id="{990A195E-A484-2346-BD18-6F71FF1F2709}" type="datetimeFigureOut">
               <a:rPr lang="en-US" smtClean="0"/>
-              <a:t>2/22/18</a:t>
+              <a:t>7/3/18</a:t>
             </a:fld>
             <a:endParaRPr lang="en-US"/>
           </a:p>
@@ -1828,7 +1828,7 @@
           <a:p>
             <a:fld id="{990A195E-A484-2346-BD18-6F71FF1F2709}" type="datetimeFigureOut">
               <a:rPr lang="en-US" smtClean="0"/>
-              <a:t>2/22/18</a:t>
+              <a:t>7/3/18</a:t>
             </a:fld>
             <a:endParaRPr lang="en-US"/>
           </a:p>
@@ -1969,7 +1969,7 @@
           <a:p>
             <a:fld id="{990A195E-A484-2346-BD18-6F71FF1F2709}" type="datetimeFigureOut">
               <a:rPr lang="en-US" smtClean="0"/>
-              <a:t>2/22/18</a:t>
+              <a:t>7/3/18</a:t>
             </a:fld>
             <a:endParaRPr lang="en-US"/>
           </a:p>
@@ -2082,7 +2082,7 @@
           <a:p>
             <a:fld id="{990A195E-A484-2346-BD18-6F71FF1F2709}" type="datetimeFigureOut">
               <a:rPr lang="en-US" smtClean="0"/>
-              <a:t>2/22/18</a:t>
+              <a:t>7/3/18</a:t>
             </a:fld>
             <a:endParaRPr lang="en-US"/>
           </a:p>
@@ -2393,7 +2393,7 @@
           <a:p>
             <a:fld id="{990A195E-A484-2346-BD18-6F71FF1F2709}" type="datetimeFigureOut">
               <a:rPr lang="en-US" smtClean="0"/>
-              <a:t>2/22/18</a:t>
+              <a:t>7/3/18</a:t>
             </a:fld>
             <a:endParaRPr lang="en-US"/>
           </a:p>
@@ -2681,7 +2681,7 @@
           <a:p>
             <a:fld id="{990A195E-A484-2346-BD18-6F71FF1F2709}" type="datetimeFigureOut">
               <a:rPr lang="en-US" smtClean="0"/>
-              <a:t>2/22/18</a:t>
+              <a:t>7/3/18</a:t>
             </a:fld>
             <a:endParaRPr lang="en-US"/>
           </a:p>
@@ -2922,7 +2922,7 @@
           <a:p>
             <a:fld id="{990A195E-A484-2346-BD18-6F71FF1F2709}" type="datetimeFigureOut">
               <a:rPr lang="en-US" smtClean="0"/>
-              <a:t>2/22/18</a:t>
+              <a:t>7/3/18</a:t>
             </a:fld>
             <a:endParaRPr lang="en-US"/>
           </a:p>
@@ -3492,7 +3492,32 @@
           <a:p>
             <a:r>
               <a:rPr lang="en-US" dirty="0"/>
-              <a:t>The atomic batch on previous slide is a general ‘atomic pointer flipping’ technique that can be applied to smaller subsets of tables.</a:t>
+              <a:t>The technique on previous slide can be generalized to an entire network of multiple devices.</a:t>
+            </a:r>
+          </a:p>
+          <a:p>
+            <a:pPr lvl="1"/>
+            <a:r>
+              <a:rPr lang="en-US" dirty="0"/>
+              <a:t>See “Abstractions for Network Update”, M. </a:t>
+            </a:r>
+            <a:r>
+              <a:rPr lang="en-US" dirty="0" err="1"/>
+              <a:t>Reitblatt</a:t>
+            </a:r>
+            <a:r>
+              <a:rPr lang="en-US" dirty="0"/>
+              <a:t>, N. Foster, J. Rexford, C. Schlesinger, D. Walker, SIGCOMM 2012</a:t>
+            </a:r>
+          </a:p>
+          <a:p>
+            <a:r>
+              <a:rPr lang="en-US"/>
+              <a:t>It is </a:t>
+            </a:r>
+            <a:r>
+              <a:rPr lang="en-US" dirty="0"/>
+              <a:t>a general ‘atomic pointer flipping’ technique that can be applied to smaller subsets of tables.</a:t>
             </a:r>
           </a:p>
           <a:p>

</xml_diff>